<commit_message>
ppt seminário NID ... 22112023
</commit_message>
<xml_diff>
--- a/PPT Seminário NID Yduqs Wyden UniRuy 2023_2.pptx
+++ b/PPT Seminário NID Yduqs Wyden UniRuy 2023_2.pptx
@@ -3958,7 +3958,7 @@
           </a:ln>
           <a:extLst>
             <a:ext uri="{C572A759-6A51-4108-AA02-DFA0A04FC94B}">
-              <ma14:wrappingTextBoxFlag xmlns="" xmlns:ma14="http://schemas.microsoft.com/office/mac/drawingml/2011/main" val="1"/>
+              <ma14:wrappingTextBoxFlag xmlns:ma14="http://schemas.microsoft.com/office/mac/drawingml/2011/main" xmlns="" val="1"/>
             </a:ext>
           </a:extLst>
         </p:spPr>
@@ -4007,7 +4007,7 @@
           </a:ln>
           <a:extLst>
             <a:ext uri="{C572A759-6A51-4108-AA02-DFA0A04FC94B}">
-              <ma14:wrappingTextBoxFlag xmlns="" xmlns:ma14="http://schemas.microsoft.com/office/mac/drawingml/2011/main" val="1"/>
+              <ma14:wrappingTextBoxFlag xmlns:ma14="http://schemas.microsoft.com/office/mac/drawingml/2011/main" xmlns="" val="1"/>
             </a:ext>
           </a:extLst>
         </p:spPr>
@@ -4978,7 +4978,7 @@
           </a:ln>
           <a:extLst>
             <a:ext uri="{C572A759-6A51-4108-AA02-DFA0A04FC94B}">
-              <ma14:wrappingTextBoxFlag xmlns="" xmlns:ma14="http://schemas.microsoft.com/office/mac/drawingml/2011/main" val="1"/>
+              <ma14:wrappingTextBoxFlag xmlns:ma14="http://schemas.microsoft.com/office/mac/drawingml/2011/main" xmlns="" val="1"/>
             </a:ext>
           </a:extLst>
         </p:spPr>
@@ -5333,7 +5333,7 @@
         </p:nvSpPr>
         <p:spPr>
           <a:xfrm>
-            <a:off x="435819" y="3508916"/>
+            <a:off x="435819" y="4050788"/>
             <a:ext cx="7729985" cy="722312"/>
           </a:xfrm>
           <a:prstGeom prst="rect">
@@ -5344,7 +5344,7 @@
           </a:ln>
           <a:extLst>
             <a:ext uri="{C572A759-6A51-4108-AA02-DFA0A04FC94B}">
-              <ma14:wrappingTextBoxFlag xmlns="" xmlns:ma14="http://schemas.microsoft.com/office/mac/drawingml/2011/main" val="1"/>
+              <ma14:wrappingTextBoxFlag xmlns:ma14="http://schemas.microsoft.com/office/mac/drawingml/2011/main" xmlns="" val="1"/>
             </a:ext>
           </a:extLst>
         </p:spPr>
@@ -5624,7 +5624,7 @@
               </a:defRPr>
             </a:pPr>
             <a:r>
-              <a:rPr lang="pt-BR" sz="3200" b="1" dirty="0">
+              <a:rPr lang="pt-BR" sz="2800" b="1" dirty="0">
                 <a:solidFill>
                   <a:schemeClr val="bg1"/>
                 </a:solidFill>
@@ -5670,12 +5670,329 @@
           </a:prstGeom>
         </p:spPr>
       </p:pic>
+      <p:sp>
+        <p:nvSpPr>
+          <p:cNvPr id="5" name="Title 1">
+            <a:extLst>
+              <a:ext uri="{FF2B5EF4-FFF2-40B4-BE49-F238E27FC236}">
+                <a16:creationId xmlns:a16="http://schemas.microsoft.com/office/drawing/2014/main" id="{751A2B4B-230F-8FEC-1662-8330C8CB0579}"/>
+              </a:ext>
+            </a:extLst>
+          </p:cNvPr>
+          <p:cNvSpPr txBox="1">
+            <a:spLocks/>
+          </p:cNvSpPr>
+          <p:nvPr/>
+        </p:nvSpPr>
+        <p:spPr>
+          <a:xfrm>
+            <a:off x="2407379" y="3407406"/>
+            <a:ext cx="2894403" cy="569021"/>
+          </a:xfrm>
+          <a:prstGeom prst="rect">
+            <a:avLst/>
+          </a:prstGeom>
+          <a:ln w="12700">
+            <a:miter lim="400000"/>
+          </a:ln>
+          <a:extLst>
+            <a:ext uri="{C572A759-6A51-4108-AA02-DFA0A04FC94B}">
+              <ma14:wrappingTextBoxFlag xmlns:ma14="http://schemas.microsoft.com/office/mac/drawingml/2011/main" xmlns="" val="1"/>
+            </a:ext>
+          </a:extLst>
+        </p:spPr>
+        <p:txBody>
+          <a:bodyPr lIns="45719" rIns="45719" anchor="ctr">
+            <a:normAutofit lnSpcReduction="10000"/>
+          </a:bodyPr>
+          <a:lstStyle>
+            <a:lvl1pPr marL="0" marR="0" indent="0" algn="ctr" defTabSz="457200" rtl="0" latinLnBrk="0">
+              <a:lnSpc>
+                <a:spcPct val="100000"/>
+              </a:lnSpc>
+              <a:spcBef>
+                <a:spcPts val="0"/>
+              </a:spcBef>
+              <a:spcAft>
+                <a:spcPts val="0"/>
+              </a:spcAft>
+              <a:buClrTx/>
+              <a:buSzTx/>
+              <a:buFontTx/>
+              <a:buNone/>
+              <a:tabLst/>
+              <a:defRPr sz="4400" b="0" i="0" u="none" strike="noStrike" cap="none" spc="0" baseline="0">
+                <a:ln>
+                  <a:noFill/>
+                </a:ln>
+                <a:solidFill>
+                  <a:srgbClr val="000000"/>
+                </a:solidFill>
+                <a:uFillTx/>
+                <a:latin typeface="+mj-lt"/>
+                <a:ea typeface="+mj-ea"/>
+                <a:cs typeface="+mj-cs"/>
+                <a:sym typeface="Calibri"/>
+              </a:defRPr>
+            </a:lvl1pPr>
+            <a:lvl2pPr marL="0" marR="0" indent="0" algn="ctr" defTabSz="457200" rtl="0" latinLnBrk="0">
+              <a:lnSpc>
+                <a:spcPct val="100000"/>
+              </a:lnSpc>
+              <a:spcBef>
+                <a:spcPts val="0"/>
+              </a:spcBef>
+              <a:spcAft>
+                <a:spcPts val="0"/>
+              </a:spcAft>
+              <a:buClrTx/>
+              <a:buSzTx/>
+              <a:buFontTx/>
+              <a:buNone/>
+              <a:tabLst/>
+              <a:defRPr sz="4400" b="0" i="0" u="none" strike="noStrike" cap="none" spc="0" baseline="0">
+                <a:ln>
+                  <a:noFill/>
+                </a:ln>
+                <a:solidFill>
+                  <a:srgbClr val="000000"/>
+                </a:solidFill>
+                <a:uFillTx/>
+                <a:latin typeface="+mj-lt"/>
+                <a:ea typeface="+mj-ea"/>
+                <a:cs typeface="+mj-cs"/>
+                <a:sym typeface="Calibri"/>
+              </a:defRPr>
+            </a:lvl2pPr>
+            <a:lvl3pPr marL="0" marR="0" indent="0" algn="ctr" defTabSz="457200" rtl="0" latinLnBrk="0">
+              <a:lnSpc>
+                <a:spcPct val="100000"/>
+              </a:lnSpc>
+              <a:spcBef>
+                <a:spcPts val="0"/>
+              </a:spcBef>
+              <a:spcAft>
+                <a:spcPts val="0"/>
+              </a:spcAft>
+              <a:buClrTx/>
+              <a:buSzTx/>
+              <a:buFontTx/>
+              <a:buNone/>
+              <a:tabLst/>
+              <a:defRPr sz="4400" b="0" i="0" u="none" strike="noStrike" cap="none" spc="0" baseline="0">
+                <a:ln>
+                  <a:noFill/>
+                </a:ln>
+                <a:solidFill>
+                  <a:srgbClr val="000000"/>
+                </a:solidFill>
+                <a:uFillTx/>
+                <a:latin typeface="+mj-lt"/>
+                <a:ea typeface="+mj-ea"/>
+                <a:cs typeface="+mj-cs"/>
+                <a:sym typeface="Calibri"/>
+              </a:defRPr>
+            </a:lvl3pPr>
+            <a:lvl4pPr marL="0" marR="0" indent="0" algn="ctr" defTabSz="457200" rtl="0" latinLnBrk="0">
+              <a:lnSpc>
+                <a:spcPct val="100000"/>
+              </a:lnSpc>
+              <a:spcBef>
+                <a:spcPts val="0"/>
+              </a:spcBef>
+              <a:spcAft>
+                <a:spcPts val="0"/>
+              </a:spcAft>
+              <a:buClrTx/>
+              <a:buSzTx/>
+              <a:buFontTx/>
+              <a:buNone/>
+              <a:tabLst/>
+              <a:defRPr sz="4400" b="0" i="0" u="none" strike="noStrike" cap="none" spc="0" baseline="0">
+                <a:ln>
+                  <a:noFill/>
+                </a:ln>
+                <a:solidFill>
+                  <a:srgbClr val="000000"/>
+                </a:solidFill>
+                <a:uFillTx/>
+                <a:latin typeface="+mj-lt"/>
+                <a:ea typeface="+mj-ea"/>
+                <a:cs typeface="+mj-cs"/>
+                <a:sym typeface="Calibri"/>
+              </a:defRPr>
+            </a:lvl4pPr>
+            <a:lvl5pPr marL="0" marR="0" indent="0" algn="ctr" defTabSz="457200" rtl="0" latinLnBrk="0">
+              <a:lnSpc>
+                <a:spcPct val="100000"/>
+              </a:lnSpc>
+              <a:spcBef>
+                <a:spcPts val="0"/>
+              </a:spcBef>
+              <a:spcAft>
+                <a:spcPts val="0"/>
+              </a:spcAft>
+              <a:buClrTx/>
+              <a:buSzTx/>
+              <a:buFontTx/>
+              <a:buNone/>
+              <a:tabLst/>
+              <a:defRPr sz="4400" b="0" i="0" u="none" strike="noStrike" cap="none" spc="0" baseline="0">
+                <a:ln>
+                  <a:noFill/>
+                </a:ln>
+                <a:solidFill>
+                  <a:srgbClr val="000000"/>
+                </a:solidFill>
+                <a:uFillTx/>
+                <a:latin typeface="+mj-lt"/>
+                <a:ea typeface="+mj-ea"/>
+                <a:cs typeface="+mj-cs"/>
+                <a:sym typeface="Calibri"/>
+              </a:defRPr>
+            </a:lvl5pPr>
+            <a:lvl6pPr marL="0" marR="0" indent="0" algn="ctr" defTabSz="457200" rtl="0" latinLnBrk="0">
+              <a:lnSpc>
+                <a:spcPct val="100000"/>
+              </a:lnSpc>
+              <a:spcBef>
+                <a:spcPts val="0"/>
+              </a:spcBef>
+              <a:spcAft>
+                <a:spcPts val="0"/>
+              </a:spcAft>
+              <a:buClrTx/>
+              <a:buSzTx/>
+              <a:buFontTx/>
+              <a:buNone/>
+              <a:tabLst/>
+              <a:defRPr sz="4400" b="0" i="0" u="none" strike="noStrike" cap="none" spc="0" baseline="0">
+                <a:ln>
+                  <a:noFill/>
+                </a:ln>
+                <a:solidFill>
+                  <a:srgbClr val="000000"/>
+                </a:solidFill>
+                <a:uFillTx/>
+                <a:latin typeface="+mj-lt"/>
+                <a:ea typeface="+mj-ea"/>
+                <a:cs typeface="+mj-cs"/>
+                <a:sym typeface="Calibri"/>
+              </a:defRPr>
+            </a:lvl6pPr>
+            <a:lvl7pPr marL="0" marR="0" indent="0" algn="ctr" defTabSz="457200" rtl="0" latinLnBrk="0">
+              <a:lnSpc>
+                <a:spcPct val="100000"/>
+              </a:lnSpc>
+              <a:spcBef>
+                <a:spcPts val="0"/>
+              </a:spcBef>
+              <a:spcAft>
+                <a:spcPts val="0"/>
+              </a:spcAft>
+              <a:buClrTx/>
+              <a:buSzTx/>
+              <a:buFontTx/>
+              <a:buNone/>
+              <a:tabLst/>
+              <a:defRPr sz="4400" b="0" i="0" u="none" strike="noStrike" cap="none" spc="0" baseline="0">
+                <a:ln>
+                  <a:noFill/>
+                </a:ln>
+                <a:solidFill>
+                  <a:srgbClr val="000000"/>
+                </a:solidFill>
+                <a:uFillTx/>
+                <a:latin typeface="+mj-lt"/>
+                <a:ea typeface="+mj-ea"/>
+                <a:cs typeface="+mj-cs"/>
+                <a:sym typeface="Calibri"/>
+              </a:defRPr>
+            </a:lvl7pPr>
+            <a:lvl8pPr marL="0" marR="0" indent="0" algn="ctr" defTabSz="457200" rtl="0" latinLnBrk="0">
+              <a:lnSpc>
+                <a:spcPct val="100000"/>
+              </a:lnSpc>
+              <a:spcBef>
+                <a:spcPts val="0"/>
+              </a:spcBef>
+              <a:spcAft>
+                <a:spcPts val="0"/>
+              </a:spcAft>
+              <a:buClrTx/>
+              <a:buSzTx/>
+              <a:buFontTx/>
+              <a:buNone/>
+              <a:tabLst/>
+              <a:defRPr sz="4400" b="0" i="0" u="none" strike="noStrike" cap="none" spc="0" baseline="0">
+                <a:ln>
+                  <a:noFill/>
+                </a:ln>
+                <a:solidFill>
+                  <a:srgbClr val="000000"/>
+                </a:solidFill>
+                <a:uFillTx/>
+                <a:latin typeface="+mj-lt"/>
+                <a:ea typeface="+mj-ea"/>
+                <a:cs typeface="+mj-cs"/>
+                <a:sym typeface="Calibri"/>
+              </a:defRPr>
+            </a:lvl8pPr>
+            <a:lvl9pPr marL="0" marR="0" indent="0" algn="ctr" defTabSz="457200" rtl="0" latinLnBrk="0">
+              <a:lnSpc>
+                <a:spcPct val="100000"/>
+              </a:lnSpc>
+              <a:spcBef>
+                <a:spcPts val="0"/>
+              </a:spcBef>
+              <a:spcAft>
+                <a:spcPts val="0"/>
+              </a:spcAft>
+              <a:buClrTx/>
+              <a:buSzTx/>
+              <a:buFontTx/>
+              <a:buNone/>
+              <a:tabLst/>
+              <a:defRPr sz="4400" b="0" i="0" u="none" strike="noStrike" cap="none" spc="0" baseline="0">
+                <a:ln>
+                  <a:noFill/>
+                </a:ln>
+                <a:solidFill>
+                  <a:srgbClr val="000000"/>
+                </a:solidFill>
+                <a:uFillTx/>
+                <a:latin typeface="+mj-lt"/>
+                <a:ea typeface="+mj-ea"/>
+                <a:cs typeface="+mj-cs"/>
+                <a:sym typeface="Calibri"/>
+              </a:defRPr>
+            </a:lvl9pPr>
+          </a:lstStyle>
+          <a:p>
+            <a:pPr algn="l" defTabSz="265175" hangingPunct="1">
+              <a:defRPr sz="2262">
+                <a:solidFill>
+                  <a:srgbClr val="FFFFFF"/>
+                </a:solidFill>
+              </a:defRPr>
+            </a:pPr>
+            <a:r>
+              <a:rPr lang="pt-BR" sz="3200" b="1" dirty="0">
+                <a:solidFill>
+                  <a:schemeClr val="accent5"/>
+                </a:solidFill>
+              </a:rPr>
+              <a:t>Lacre com Amor</a:t>
+            </a:r>
+          </a:p>
+        </p:txBody>
+      </p:sp>
       <p:pic>
         <p:nvPicPr>
-          <p:cNvPr id="4" name="Imagem 3" descr="Interface gráfica do usuário&#10;&#10;Descrição gerada automaticamente">
+          <p:cNvPr id="14" name="Imagem 13" descr="Logotipo, nome da empresa&#10;&#10;Descrição gerada automaticamente">
             <a:extLst>
               <a:ext uri="{FF2B5EF4-FFF2-40B4-BE49-F238E27FC236}">
-                <a16:creationId xmlns:a16="http://schemas.microsoft.com/office/drawing/2014/main" id="{C01101BB-2F50-0FBE-FC5B-9408F9DAD464}"/>
+                <a16:creationId xmlns:a16="http://schemas.microsoft.com/office/drawing/2014/main" id="{8C49B55C-A2D0-7652-7966-0F236518C0B2}"/>
               </a:ext>
             </a:extLst>
           </p:cNvPr>
@@ -5698,8 +6015,8 @@
         </p:blipFill>
         <p:spPr>
           <a:xfrm>
-            <a:off x="7473252" y="3658845"/>
-            <a:ext cx="1648173" cy="1443157"/>
+            <a:off x="3305173" y="1373925"/>
+            <a:ext cx="1098817" cy="1138061"/>
           </a:xfrm>
           <a:prstGeom prst="rect">
             <a:avLst/>
@@ -7697,7 +8014,7 @@
           </a:ln>
           <a:extLst>
             <a:ext uri="{C572A759-6A51-4108-AA02-DFA0A04FC94B}">
-              <ma14:wrappingTextBoxFlag xmlns="" xmlns:ma14="http://schemas.microsoft.com/office/mac/drawingml/2011/main" val="1"/>
+              <ma14:wrappingTextBoxFlag xmlns:ma14="http://schemas.microsoft.com/office/mac/drawingml/2011/main" xmlns="" val="1"/>
             </a:ext>
           </a:extLst>
         </p:spPr>
@@ -8014,9 +8331,45 @@
           </a:stretch>
         </p:blipFill>
         <p:spPr>
+          <a:xfrm rot="19233663">
+            <a:off x="6224576" y="2483554"/>
+            <a:ext cx="2566561" cy="1044325"/>
+          </a:xfrm>
+          <a:prstGeom prst="rect">
+            <a:avLst/>
+          </a:prstGeom>
+        </p:spPr>
+      </p:pic>
+      <p:pic>
+        <p:nvPicPr>
+          <p:cNvPr id="4" name="Imagem 3" descr="Logotipo, nome da empresa&#10;&#10;Descrição gerada automaticamente">
+            <a:extLst>
+              <a:ext uri="{FF2B5EF4-FFF2-40B4-BE49-F238E27FC236}">
+                <a16:creationId xmlns:a16="http://schemas.microsoft.com/office/drawing/2014/main" id="{C58B852A-A624-BE81-774D-4D07B346FC5F}"/>
+              </a:ext>
+            </a:extLst>
+          </p:cNvPr>
+          <p:cNvPicPr>
+            <a:picLocks noChangeAspect="1"/>
+          </p:cNvPicPr>
+          <p:nvPr/>
+        </p:nvPicPr>
+        <p:blipFill>
+          <a:blip r:embed="rId3" cstate="print">
+            <a:extLst>
+              <a:ext uri="{28A0092B-C50C-407E-A947-70E740481C1C}">
+                <a14:useLocalDpi xmlns:a14="http://schemas.microsoft.com/office/drawing/2010/main" val="0"/>
+              </a:ext>
+            </a:extLst>
+          </a:blip>
+          <a:stretch>
+            <a:fillRect/>
+          </a:stretch>
+        </p:blipFill>
+        <p:spPr>
           <a:xfrm>
-            <a:off x="2566975" y="-7567"/>
-            <a:ext cx="3912849" cy="1592125"/>
+            <a:off x="3822972" y="77368"/>
+            <a:ext cx="1452900" cy="1504790"/>
           </a:xfrm>
           <a:prstGeom prst="rect">
             <a:avLst/>
@@ -10239,18 +10592,18 @@
 </file>
 
 <file path=customXml/item1.xml><?xml version="1.0" encoding="utf-8"?>
+<p:properties xmlns:p="http://schemas.microsoft.com/office/2006/metadata/properties" xmlns:xsi="http://www.w3.org/2001/XMLSchema-instance" xmlns:pc="http://schemas.microsoft.com/office/infopath/2007/PartnerControls">
+  <documentManagement/>
+</p:properties>
+</file>
+
+<file path=customXml/item2.xml><?xml version="1.0" encoding="utf-8"?>
 <?mso-contentType ?>
 <FormTemplates xmlns="http://schemas.microsoft.com/sharepoint/v3/contenttype/forms">
   <Display>DocumentLibraryForm</Display>
   <Edit>DocumentLibraryForm</Edit>
   <New>DocumentLibraryForm</New>
 </FormTemplates>
-</file>
-
-<file path=customXml/item2.xml><?xml version="1.0" encoding="utf-8"?>
-<p:properties xmlns:p="http://schemas.microsoft.com/office/2006/metadata/properties" xmlns:xsi="http://www.w3.org/2001/XMLSchema-instance" xmlns:pc="http://schemas.microsoft.com/office/infopath/2007/PartnerControls">
-  <documentManagement/>
-</p:properties>
 </file>
 
 <file path=customXml/item3.xml><?xml version="1.0" encoding="utf-8"?>
@@ -10477,18 +10830,18 @@
 </file>
 
 <file path=customXml/itemProps1.xml><?xml version="1.0" encoding="utf-8"?>
-<ds:datastoreItem xmlns:ds="http://schemas.openxmlformats.org/officeDocument/2006/customXml" ds:itemID="{AED456AD-07D2-43E3-AD57-2C9049066662}">
+<ds:datastoreItem xmlns:ds="http://schemas.openxmlformats.org/officeDocument/2006/customXml" ds:itemID="{961A30F4-F1EA-4F98-A164-76D337EE5565}">
   <ds:schemaRefs>
-    <ds:schemaRef ds:uri="http://schemas.microsoft.com/sharepoint/v3/contenttype/forms"/>
+    <ds:schemaRef ds:uri="http://schemas.microsoft.com/office/2006/metadata/properties"/>
+    <ds:schemaRef ds:uri="http://schemas.microsoft.com/office/infopath/2007/PartnerControls"/>
   </ds:schemaRefs>
 </ds:datastoreItem>
 </file>
 
 <file path=customXml/itemProps2.xml><?xml version="1.0" encoding="utf-8"?>
-<ds:datastoreItem xmlns:ds="http://schemas.openxmlformats.org/officeDocument/2006/customXml" ds:itemID="{961A30F4-F1EA-4F98-A164-76D337EE5565}">
+<ds:datastoreItem xmlns:ds="http://schemas.openxmlformats.org/officeDocument/2006/customXml" ds:itemID="{AED456AD-07D2-43E3-AD57-2C9049066662}">
   <ds:schemaRefs>
-    <ds:schemaRef ds:uri="http://schemas.microsoft.com/office/2006/metadata/properties"/>
-    <ds:schemaRef ds:uri="http://schemas.microsoft.com/office/infopath/2007/PartnerControls"/>
+    <ds:schemaRef ds:uri="http://schemas.microsoft.com/sharepoint/v3/contenttype/forms"/>
   </ds:schemaRefs>
 </ds:datastoreItem>
 </file>

</xml_diff>

<commit_message>
ppt seminário NID .... 22112023
</commit_message>
<xml_diff>
--- a/PPT Seminário NID Yduqs Wyden UniRuy 2023_2.pptx
+++ b/PPT Seminário NID Yduqs Wyden UniRuy 2023_2.pptx
@@ -3958,7 +3958,7 @@
           </a:ln>
           <a:extLst>
             <a:ext uri="{C572A759-6A51-4108-AA02-DFA0A04FC94B}">
-              <ma14:wrappingTextBoxFlag xmlns:ma14="http://schemas.microsoft.com/office/mac/drawingml/2011/main" xmlns="" val="1"/>
+              <ma14:wrappingTextBoxFlag xmlns="" xmlns:ma14="http://schemas.microsoft.com/office/mac/drawingml/2011/main" val="1"/>
             </a:ext>
           </a:extLst>
         </p:spPr>
@@ -4007,7 +4007,7 @@
           </a:ln>
           <a:extLst>
             <a:ext uri="{C572A759-6A51-4108-AA02-DFA0A04FC94B}">
-              <ma14:wrappingTextBoxFlag xmlns:ma14="http://schemas.microsoft.com/office/mac/drawingml/2011/main" xmlns="" val="1"/>
+              <ma14:wrappingTextBoxFlag xmlns="" xmlns:ma14="http://schemas.microsoft.com/office/mac/drawingml/2011/main" val="1"/>
             </a:ext>
           </a:extLst>
         </p:spPr>
@@ -4978,7 +4978,7 @@
           </a:ln>
           <a:extLst>
             <a:ext uri="{C572A759-6A51-4108-AA02-DFA0A04FC94B}">
-              <ma14:wrappingTextBoxFlag xmlns:ma14="http://schemas.microsoft.com/office/mac/drawingml/2011/main" xmlns="" val="1"/>
+              <ma14:wrappingTextBoxFlag xmlns="" xmlns:ma14="http://schemas.microsoft.com/office/mac/drawingml/2011/main" val="1"/>
             </a:ext>
           </a:extLst>
         </p:spPr>
@@ -5344,7 +5344,7 @@
           </a:ln>
           <a:extLst>
             <a:ext uri="{C572A759-6A51-4108-AA02-DFA0A04FC94B}">
-              <ma14:wrappingTextBoxFlag xmlns:ma14="http://schemas.microsoft.com/office/mac/drawingml/2011/main" xmlns="" val="1"/>
+              <ma14:wrappingTextBoxFlag xmlns="" xmlns:ma14="http://schemas.microsoft.com/office/mac/drawingml/2011/main" val="1"/>
             </a:ext>
           </a:extLst>
         </p:spPr>
@@ -5687,7 +5687,7 @@
         <p:spPr>
           <a:xfrm>
             <a:off x="2407379" y="3407406"/>
-            <a:ext cx="2894403" cy="569021"/>
+            <a:ext cx="3124177" cy="569021"/>
           </a:xfrm>
           <a:prstGeom prst="rect">
             <a:avLst/>
@@ -5697,7 +5697,7 @@
           </a:ln>
           <a:extLst>
             <a:ext uri="{C572A759-6A51-4108-AA02-DFA0A04FC94B}">
-              <ma14:wrappingTextBoxFlag xmlns:ma14="http://schemas.microsoft.com/office/mac/drawingml/2011/main" xmlns="" val="1"/>
+              <ma14:wrappingTextBoxFlag xmlns="" xmlns:ma14="http://schemas.microsoft.com/office/mac/drawingml/2011/main" val="1"/>
             </a:ext>
           </a:extLst>
         </p:spPr>
@@ -5969,7 +5969,7 @@
             </a:lvl9pPr>
           </a:lstStyle>
           <a:p>
-            <a:pPr algn="l" defTabSz="265175" hangingPunct="1">
+            <a:pPr defTabSz="265175" hangingPunct="1">
               <a:defRPr sz="2262">
                 <a:solidFill>
                   <a:srgbClr val="FFFFFF"/>
@@ -8014,7 +8014,7 @@
           </a:ln>
           <a:extLst>
             <a:ext uri="{C572A759-6A51-4108-AA02-DFA0A04FC94B}">
-              <ma14:wrappingTextBoxFlag xmlns:ma14="http://schemas.microsoft.com/office/mac/drawingml/2011/main" xmlns="" val="1"/>
+              <ma14:wrappingTextBoxFlag xmlns="" xmlns:ma14="http://schemas.microsoft.com/office/mac/drawingml/2011/main" val="1"/>
             </a:ext>
           </a:extLst>
         </p:spPr>
@@ -10592,18 +10592,18 @@
 </file>
 
 <file path=customXml/item1.xml><?xml version="1.0" encoding="utf-8"?>
-<p:properties xmlns:p="http://schemas.microsoft.com/office/2006/metadata/properties" xmlns:xsi="http://www.w3.org/2001/XMLSchema-instance" xmlns:pc="http://schemas.microsoft.com/office/infopath/2007/PartnerControls">
-  <documentManagement/>
-</p:properties>
-</file>
-
-<file path=customXml/item2.xml><?xml version="1.0" encoding="utf-8"?>
 <?mso-contentType ?>
 <FormTemplates xmlns="http://schemas.microsoft.com/sharepoint/v3/contenttype/forms">
   <Display>DocumentLibraryForm</Display>
   <Edit>DocumentLibraryForm</Edit>
   <New>DocumentLibraryForm</New>
 </FormTemplates>
+</file>
+
+<file path=customXml/item2.xml><?xml version="1.0" encoding="utf-8"?>
+<p:properties xmlns:p="http://schemas.microsoft.com/office/2006/metadata/properties" xmlns:xsi="http://www.w3.org/2001/XMLSchema-instance" xmlns:pc="http://schemas.microsoft.com/office/infopath/2007/PartnerControls">
+  <documentManagement/>
+</p:properties>
 </file>
 
 <file path=customXml/item3.xml><?xml version="1.0" encoding="utf-8"?>
@@ -10830,18 +10830,18 @@
 </file>
 
 <file path=customXml/itemProps1.xml><?xml version="1.0" encoding="utf-8"?>
-<ds:datastoreItem xmlns:ds="http://schemas.openxmlformats.org/officeDocument/2006/customXml" ds:itemID="{961A30F4-F1EA-4F98-A164-76D337EE5565}">
+<ds:datastoreItem xmlns:ds="http://schemas.openxmlformats.org/officeDocument/2006/customXml" ds:itemID="{AED456AD-07D2-43E3-AD57-2C9049066662}">
   <ds:schemaRefs>
-    <ds:schemaRef ds:uri="http://schemas.microsoft.com/office/2006/metadata/properties"/>
-    <ds:schemaRef ds:uri="http://schemas.microsoft.com/office/infopath/2007/PartnerControls"/>
+    <ds:schemaRef ds:uri="http://schemas.microsoft.com/sharepoint/v3/contenttype/forms"/>
   </ds:schemaRefs>
 </ds:datastoreItem>
 </file>
 
 <file path=customXml/itemProps2.xml><?xml version="1.0" encoding="utf-8"?>
-<ds:datastoreItem xmlns:ds="http://schemas.openxmlformats.org/officeDocument/2006/customXml" ds:itemID="{AED456AD-07D2-43E3-AD57-2C9049066662}">
+<ds:datastoreItem xmlns:ds="http://schemas.openxmlformats.org/officeDocument/2006/customXml" ds:itemID="{961A30F4-F1EA-4F98-A164-76D337EE5565}">
   <ds:schemaRefs>
-    <ds:schemaRef ds:uri="http://schemas.microsoft.com/sharepoint/v3/contenttype/forms"/>
+    <ds:schemaRef ds:uri="http://schemas.microsoft.com/office/2006/metadata/properties"/>
+    <ds:schemaRef ds:uri="http://schemas.microsoft.com/office/infopath/2007/PartnerControls"/>
   </ds:schemaRefs>
 </ds:datastoreItem>
 </file>

</xml_diff>